<commit_message>
change pptx, change .xslx
</commit_message>
<xml_diff>
--- a/doc/04-ScrumSetup/Task_3&4_Presentation.pptx
+++ b/doc/04-ScrumSetup/Task_3&4_Presentation.pptx
@@ -13,7 +13,7 @@
     <p:sldId id="261" r:id="rId7"/>
     <p:sldId id="259" r:id="rId8"/>
     <p:sldId id="264" r:id="rId9"/>
-    <p:sldId id="258" r:id="rId10"/>
+    <p:sldId id="267" r:id="rId10"/>
     <p:sldId id="265" r:id="rId11"/>
     <p:sldId id="266" r:id="rId12"/>
   </p:sldIdLst>
@@ -258,7 +258,7 @@
               <a:pPr>
                 <a:defRPr/>
               </a:pPr>
-              <a:t>21.11.2017</a:t>
+              <a:t>22.11.2017</a:t>
             </a:fld>
             <a:endParaRPr lang="de-CH" dirty="0"/>
           </a:p>
@@ -848,9 +848,17 @@
             <a:br>
               <a:rPr lang="de-DE" noProof="0" dirty="0"/>
             </a:br>
+            <a:r>
+              <a:rPr lang="de-DE" noProof="0" dirty="0"/>
+              <a:t/>
+            </a:r>
             <a:br>
               <a:rPr lang="de-DE" noProof="0" dirty="0"/>
             </a:br>
+            <a:r>
+              <a:rPr lang="de-DE" noProof="0" dirty="0"/>
+              <a:t/>
+            </a:r>
             <a:br>
               <a:rPr lang="de-DE" noProof="0" dirty="0"/>
             </a:br>
@@ -1185,7 +1193,7 @@
               <a:pPr>
                 <a:defRPr/>
               </a:pPr>
-              <a:t>21.11.2017</a:t>
+              <a:t>22.11.2017</a:t>
             </a:fld>
             <a:r>
               <a:rPr lang="de-DE" sz="1000" dirty="0"/>
@@ -2622,7 +2630,7 @@
               <a:pPr>
                 <a:defRPr/>
               </a:pPr>
-              <a:t>21.11.2017</a:t>
+              <a:t>22.11.2017</a:t>
             </a:fld>
             <a:r>
               <a:rPr lang="de-DE" sz="1000" dirty="0"/>
@@ -6911,7 +6919,7 @@
           <p:cNvPr id="4" name="Inhaltsplatzhalter 3">
             <a:extLst>
               <a:ext uri="{FF2B5EF4-FFF2-40B4-BE49-F238E27FC236}">
-                <a16:creationId xmlns:a16="http://schemas.microsoft.com/office/drawing/2014/main" id="{12647EB5-1084-42AD-891B-C18A4EDB652A}"/>
+                <a16:creationId xmlns:a16="http://schemas.microsoft.com/office/drawing/2014/main" xmlns="" id="{12647EB5-1084-42AD-891B-C18A4EDB652A}"/>
               </a:ext>
             </a:extLst>
           </p:cNvPr>
@@ -7075,7 +7083,7 @@
           <p:cNvPr id="4" name="Inhaltsplatzhalter 3">
             <a:extLst>
               <a:ext uri="{FF2B5EF4-FFF2-40B4-BE49-F238E27FC236}">
-                <a16:creationId xmlns:a16="http://schemas.microsoft.com/office/drawing/2014/main" id="{50432C2A-DEE9-4B17-85F5-A5102F17B189}"/>
+                <a16:creationId xmlns:a16="http://schemas.microsoft.com/office/drawing/2014/main" xmlns="" id="{50432C2A-DEE9-4B17-85F5-A5102F17B189}"/>
               </a:ext>
             </a:extLst>
           </p:cNvPr>
@@ -7127,6 +7135,25 @@
       </p:grpSpPr>
       <p:sp>
         <p:nvSpPr>
+          <p:cNvPr id="2" name="Inhaltsplatzhalter 1"/>
+          <p:cNvSpPr>
+            <a:spLocks noGrp="1"/>
+          </p:cNvSpPr>
+          <p:nvPr>
+            <p:ph sz="half" idx="1"/>
+          </p:nvPr>
+        </p:nvSpPr>
+        <p:spPr/>
+        <p:txBody>
+          <a:bodyPr/>
+          <a:lstStyle/>
+          <a:p>
+            <a:endParaRPr lang="de-CH" dirty="0"/>
+          </a:p>
+        </p:txBody>
+      </p:sp>
+      <p:sp>
+        <p:nvSpPr>
           <p:cNvPr id="3" name="Titel 2"/>
           <p:cNvSpPr>
             <a:spLocks noGrp="1"/>
@@ -7141,20 +7168,17 @@
           <a:lstStyle/>
           <a:p>
             <a:r>
-              <a:rPr lang="de-CH" dirty="0" err="1"/>
-              <a:t>Scröm</a:t>
-            </a:r>
-            <a:r>
-              <a:rPr lang="de-CH" dirty="0"/>
-              <a:t> Setup</a:t>
-            </a:r>
+              <a:rPr lang="de-CH" dirty="0" smtClean="0"/>
+              <a:t>SCRUM Setup</a:t>
+            </a:r>
+            <a:endParaRPr lang="de-CH" dirty="0"/>
           </a:p>
         </p:txBody>
       </p:sp>
     </p:spTree>
     <p:extLst>
       <p:ext uri="{BB962C8B-B14F-4D97-AF65-F5344CB8AC3E}">
-        <p14:creationId xmlns:p14="http://schemas.microsoft.com/office/powerpoint/2010/main" val="1312568616"/>
+        <p14:creationId xmlns:p14="http://schemas.microsoft.com/office/powerpoint/2010/main" val="3417941587"/>
       </p:ext>
     </p:extLst>
   </p:cSld>
@@ -7982,19 +8006,12 @@
 </file>
 
 <file path=customXml/item1.xml><?xml version="1.0" encoding="utf-8"?>
-<p:properties xmlns:p="http://schemas.microsoft.com/office/2006/metadata/properties" xmlns:xsi="http://www.w3.org/2001/XMLSchema-instance" xmlns:pc="http://schemas.microsoft.com/office/infopath/2007/PartnerControls">
-  <documentManagement>
-    <QMPilot_DokID xmlns="2551ef7e-3b29-44d1-a8ad-ef34c26bfc60">470</QMPilot_DokID>
-    <BfhIntranetDepartmentText xmlns="f6f68f68-5570-446d-b1e6-2310e70d83d3">
-      <Terms xmlns="http://schemas.microsoft.com/office/infopath/2007/PartnerControls">
-        <TermInfo xmlns="http://schemas.microsoft.com/office/infopath/2007/PartnerControls">
-          <TermName xmlns="http://schemas.microsoft.com/office/infopath/2007/PartnerControls">Vorlage</TermName>
-          <TermId xmlns="http://schemas.microsoft.com/office/infopath/2007/PartnerControls">de1a6d3c-ac6a-4b34-8edd-308eb81066db</TermId>
-        </TermInfo>
-      </Terms>
-    </BfhIntranetDepartmentText>
-  </documentManagement>
-</p:properties>
+<?mso-contentType ?>
+<FormTemplates xmlns="http://schemas.microsoft.com/sharepoint/v3/contenttype/forms">
+  <Display>DocumentLibraryForm</Display>
+  <Edit>DocumentLibraryForm</Edit>
+  <New>DocumentLibraryForm</New>
+</FormTemplates>
 </file>
 
 <file path=customXml/item2.xml><?xml version="1.0" encoding="utf-8"?>
@@ -8137,21 +8154,25 @@
 </file>
 
 <file path=customXml/item3.xml><?xml version="1.0" encoding="utf-8"?>
-<?mso-contentType ?>
-<FormTemplates xmlns="http://schemas.microsoft.com/sharepoint/v3/contenttype/forms">
-  <Display>DocumentLibraryForm</Display>
-  <Edit>DocumentLibraryForm</Edit>
-  <New>DocumentLibraryForm</New>
-</FormTemplates>
+<p:properties xmlns:p="http://schemas.microsoft.com/office/2006/metadata/properties" xmlns:xsi="http://www.w3.org/2001/XMLSchema-instance" xmlns:pc="http://schemas.microsoft.com/office/infopath/2007/PartnerControls">
+  <documentManagement>
+    <QMPilot_DokID xmlns="2551ef7e-3b29-44d1-a8ad-ef34c26bfc60">470</QMPilot_DokID>
+    <BfhIntranetDepartmentText xmlns="f6f68f68-5570-446d-b1e6-2310e70d83d3">
+      <Terms xmlns="http://schemas.microsoft.com/office/infopath/2007/PartnerControls">
+        <TermInfo xmlns="http://schemas.microsoft.com/office/infopath/2007/PartnerControls">
+          <TermName xmlns="http://schemas.microsoft.com/office/infopath/2007/PartnerControls">Vorlage</TermName>
+          <TermId xmlns="http://schemas.microsoft.com/office/infopath/2007/PartnerControls">de1a6d3c-ac6a-4b34-8edd-308eb81066db</TermId>
+        </TermInfo>
+      </Terms>
+    </BfhIntranetDepartmentText>
+  </documentManagement>
+</p:properties>
 </file>
 
 <file path=customXml/itemProps1.xml><?xml version="1.0" encoding="utf-8"?>
-<ds:datastoreItem xmlns:ds="http://schemas.openxmlformats.org/officeDocument/2006/customXml" ds:itemID="{A0E21803-70F9-41A8-9C11-39A2457CDDF7}">
+<ds:datastoreItem xmlns:ds="http://schemas.openxmlformats.org/officeDocument/2006/customXml" ds:itemID="{9D47BE21-B709-4D16-ABB2-11D40677E528}">
   <ds:schemaRefs>
-    <ds:schemaRef ds:uri="http://schemas.microsoft.com/office/2006/metadata/properties"/>
-    <ds:schemaRef ds:uri="http://schemas.microsoft.com/office/infopath/2007/PartnerControls"/>
-    <ds:schemaRef ds:uri="2551ef7e-3b29-44d1-a8ad-ef34c26bfc60"/>
-    <ds:schemaRef ds:uri="f6f68f68-5570-446d-b1e6-2310e70d83d3"/>
+    <ds:schemaRef ds:uri="http://schemas.microsoft.com/sharepoint/v3/contenttype/forms"/>
   </ds:schemaRefs>
 </ds:datastoreItem>
 </file>
@@ -8176,9 +8197,12 @@
 </file>
 
 <file path=customXml/itemProps3.xml><?xml version="1.0" encoding="utf-8"?>
-<ds:datastoreItem xmlns:ds="http://schemas.openxmlformats.org/officeDocument/2006/customXml" ds:itemID="{9D47BE21-B709-4D16-ABB2-11D40677E528}">
+<ds:datastoreItem xmlns:ds="http://schemas.openxmlformats.org/officeDocument/2006/customXml" ds:itemID="{A0E21803-70F9-41A8-9C11-39A2457CDDF7}">
   <ds:schemaRefs>
-    <ds:schemaRef ds:uri="http://schemas.microsoft.com/sharepoint/v3/contenttype/forms"/>
+    <ds:schemaRef ds:uri="http://schemas.microsoft.com/office/2006/metadata/properties"/>
+    <ds:schemaRef ds:uri="http://schemas.microsoft.com/office/infopath/2007/PartnerControls"/>
+    <ds:schemaRef ds:uri="2551ef7e-3b29-44d1-a8ad-ef34c26bfc60"/>
+    <ds:schemaRef ds:uri="f6f68f68-5570-446d-b1e6-2310e70d83d3"/>
   </ds:schemaRefs>
 </ds:datastoreItem>
 </file>
</xml_diff>

<commit_message>
added my part for presentation
</commit_message>
<xml_diff>
--- a/doc/04-ScrumSetup/Task_3&4_Presentation.pptx
+++ b/doc/04-ScrumSetup/Task_3&4_Presentation.pptx
@@ -848,17 +848,9 @@
             <a:br>
               <a:rPr lang="de-DE" noProof="0" dirty="0"/>
             </a:br>
-            <a:r>
-              <a:rPr lang="de-DE" noProof="0" dirty="0"/>
-              <a:t/>
-            </a:r>
             <a:br>
               <a:rPr lang="de-DE" noProof="0" dirty="0"/>
             </a:br>
-            <a:r>
-              <a:rPr lang="de-DE" noProof="0" dirty="0"/>
-              <a:t/>
-            </a:r>
             <a:br>
               <a:rPr lang="de-DE" noProof="0" dirty="0"/>
             </a:br>
@@ -6517,56 +6509,6 @@
           <a:chExt cx="0" cy="0"/>
         </a:xfrm>
       </p:grpSpPr>
-      <p:pic>
-        <p:nvPicPr>
-          <p:cNvPr id="2" name="Bildplatzhalter 1"/>
-          <p:cNvPicPr>
-            <a:picLocks noGrp="1" noChangeAspect="1"/>
-          </p:cNvPicPr>
-          <p:nvPr>
-            <p:ph type="pic" sz="quarter" idx="11"/>
-          </p:nvPr>
-        </p:nvPicPr>
-        <p:blipFill>
-          <a:blip r:embed="rId2">
-            <a:extLst>
-              <a:ext uri="{28A0092B-C50C-407E-A947-70E740481C1C}">
-                <a14:useLocalDpi xmlns:a14="http://schemas.microsoft.com/office/drawing/2010/main" val="0"/>
-              </a:ext>
-            </a:extLst>
-          </a:blip>
-          <a:srcRect t="26005" b="26005"/>
-          <a:stretch>
-            <a:fillRect/>
-          </a:stretch>
-        </p:blipFill>
-        <p:spPr bwMode="auto">
-          <a:xfrm>
-            <a:off x="0" y="1692275"/>
-            <a:ext cx="7632700" cy="2808288"/>
-          </a:xfrm>
-          <a:noFill/>
-          <a:extLst>
-            <a:ext uri="{909E8E84-426E-40DD-AFC4-6F175D3DCCD1}">
-              <a14:hiddenFill xmlns:a14="http://schemas.microsoft.com/office/drawing/2010/main">
-                <a:solidFill>
-                  <a:srgbClr val="FFFFFF"/>
-                </a:solidFill>
-              </a14:hiddenFill>
-            </a:ext>
-            <a:ext uri="{91240B29-F687-4F45-9708-019B960494DF}">
-              <a14:hiddenLine xmlns:a14="http://schemas.microsoft.com/office/drawing/2010/main" w="9525">
-                <a:solidFill>
-                  <a:srgbClr val="000000"/>
-                </a:solidFill>
-                <a:miter lim="800000"/>
-                <a:headEnd/>
-                <a:tailEnd/>
-              </a14:hiddenLine>
-            </a:ext>
-          </a:extLst>
-        </p:spPr>
-      </p:pic>
       <p:sp>
         <p:nvSpPr>
           <p:cNvPr id="6147" name="Titel 2"/>
@@ -6686,7 +6628,7 @@
                 <a:latin typeface="Lucida Sans" pitchFamily="34" charset="0"/>
                 <a:cs typeface="Lucida Sans Unicode" pitchFamily="34" charset="0"/>
               </a:rPr>
-              <a:t> </a:t>
+              <a:t> Setup</a:t>
             </a:r>
           </a:p>
           <a:p>
@@ -6770,6 +6712,36 @@
           </a:p>
         </p:txBody>
       </p:sp>
+      <p:pic>
+        <p:nvPicPr>
+          <p:cNvPr id="14" name="Grafik 13">
+            <a:extLst>
+              <a:ext uri="{FF2B5EF4-FFF2-40B4-BE49-F238E27FC236}">
+                <a16:creationId xmlns:a16="http://schemas.microsoft.com/office/drawing/2014/main" id="{2E9A2A1D-37DF-4512-A325-1061D0799F67}"/>
+              </a:ext>
+            </a:extLst>
+          </p:cNvPr>
+          <p:cNvPicPr>
+            <a:picLocks noChangeAspect="1"/>
+          </p:cNvPicPr>
+          <p:nvPr/>
+        </p:nvPicPr>
+        <p:blipFill>
+          <a:blip r:embed="rId2"/>
+          <a:stretch>
+            <a:fillRect/>
+          </a:stretch>
+        </p:blipFill>
+        <p:spPr>
+          <a:xfrm>
+            <a:off x="14068" y="1698840"/>
+            <a:ext cx="7632000" cy="2808000"/>
+          </a:xfrm>
+          <a:prstGeom prst="rect">
+            <a:avLst/>
+          </a:prstGeom>
+        </p:spPr>
+      </p:pic>
     </p:spTree>
   </p:cSld>
   <p:clrMapOvr>
@@ -6795,25 +6767,35 @@
           <a:chExt cx="0" cy="0"/>
         </a:xfrm>
       </p:grpSpPr>
-      <p:sp>
-        <p:nvSpPr>
-          <p:cNvPr id="6" name="Inhaltsplatzhalter 5"/>
-          <p:cNvSpPr>
-            <a:spLocks noGrp="1"/>
-          </p:cNvSpPr>
+      <p:pic>
+        <p:nvPicPr>
+          <p:cNvPr id="3" name="Inhaltsplatzhalter 2">
+            <a:extLst>
+              <a:ext uri="{FF2B5EF4-FFF2-40B4-BE49-F238E27FC236}">
+                <a16:creationId xmlns:a16="http://schemas.microsoft.com/office/drawing/2014/main" id="{FE1CBA32-8850-464B-8859-1FC3315649A2}"/>
+              </a:ext>
+            </a:extLst>
+          </p:cNvPr>
+          <p:cNvPicPr>
+            <a:picLocks noGrp="1" noChangeAspect="1"/>
+          </p:cNvPicPr>
           <p:nvPr>
             <p:ph sz="half" idx="1"/>
           </p:nvPr>
-        </p:nvSpPr>
-        <p:spPr/>
-        <p:txBody>
-          <a:bodyPr/>
-          <a:lstStyle/>
-          <a:p>
-            <a:endParaRPr lang="de-CH" dirty="0"/>
-          </a:p>
-        </p:txBody>
-      </p:sp>
+        </p:nvPicPr>
+        <p:blipFill>
+          <a:blip r:embed="rId2"/>
+          <a:stretch>
+            <a:fillRect/>
+          </a:stretch>
+        </p:blipFill>
+        <p:spPr>
+          <a:xfrm>
+            <a:off x="3796444" y="900000"/>
+            <a:ext cx="5108405" cy="5611696"/>
+          </a:xfrm>
+        </p:spPr>
+      </p:pic>
       <p:sp>
         <p:nvSpPr>
           <p:cNvPr id="5" name="Titel 4"/>
@@ -6914,31 +6896,35 @@
           </a:p>
         </p:txBody>
       </p:sp>
-      <p:sp>
-        <p:nvSpPr>
-          <p:cNvPr id="4" name="Inhaltsplatzhalter 3">
+      <p:pic>
+        <p:nvPicPr>
+          <p:cNvPr id="5" name="Inhaltsplatzhalter 4">
             <a:extLst>
               <a:ext uri="{FF2B5EF4-FFF2-40B4-BE49-F238E27FC236}">
-                <a16:creationId xmlns:a16="http://schemas.microsoft.com/office/drawing/2014/main" xmlns="" id="{12647EB5-1084-42AD-891B-C18A4EDB652A}"/>
+                <a16:creationId xmlns:a16="http://schemas.microsoft.com/office/drawing/2014/main" id="{15FDAE4E-7871-4386-8CD1-AA471DAE9E4A}"/>
               </a:ext>
             </a:extLst>
           </p:cNvPr>
-          <p:cNvSpPr>
-            <a:spLocks noGrp="1"/>
-          </p:cNvSpPr>
+          <p:cNvPicPr>
+            <a:picLocks noGrp="1" noChangeAspect="1"/>
+          </p:cNvPicPr>
           <p:nvPr>
             <p:ph sz="half" idx="1"/>
           </p:nvPr>
-        </p:nvSpPr>
-        <p:spPr/>
-        <p:txBody>
-          <a:bodyPr/>
-          <a:lstStyle/>
-          <a:p>
-            <a:endParaRPr lang="de-CH" dirty="0"/>
-          </a:p>
-        </p:txBody>
-      </p:sp>
+        </p:nvPicPr>
+        <p:blipFill>
+          <a:blip r:embed="rId2"/>
+          <a:stretch>
+            <a:fillRect/>
+          </a:stretch>
+        </p:blipFill>
+        <p:spPr>
+          <a:xfrm>
+            <a:off x="1043865" y="1003067"/>
+            <a:ext cx="9957069" cy="5189107"/>
+          </a:xfrm>
+        </p:spPr>
+      </p:pic>
     </p:spTree>
     <p:extLst>
       <p:ext uri="{BB962C8B-B14F-4D97-AF65-F5344CB8AC3E}">
@@ -7083,7 +7069,7 @@
           <p:cNvPr id="4" name="Inhaltsplatzhalter 3">
             <a:extLst>
               <a:ext uri="{FF2B5EF4-FFF2-40B4-BE49-F238E27FC236}">
-                <a16:creationId xmlns:a16="http://schemas.microsoft.com/office/drawing/2014/main" xmlns="" id="{50432C2A-DEE9-4B17-85F5-A5102F17B189}"/>
+                <a16:creationId xmlns:a16="http://schemas.microsoft.com/office/drawing/2014/main" id="{50432C2A-DEE9-4B17-85F5-A5102F17B189}"/>
               </a:ext>
             </a:extLst>
           </p:cNvPr>
@@ -7168,10 +7154,9 @@
           <a:lstStyle/>
           <a:p>
             <a:r>
-              <a:rPr lang="de-CH" dirty="0" smtClean="0"/>
+              <a:rPr lang="de-CH" dirty="0"/>
               <a:t>SCRUM Setup</a:t>
             </a:r>
-            <a:endParaRPr lang="de-CH" dirty="0"/>
           </a:p>
         </p:txBody>
       </p:sp>
@@ -7222,7 +7207,7 @@
           <a:p>
             <a:r>
               <a:rPr lang="en-US" dirty="0" err="1"/>
-              <a:t>Zeitmanagement</a:t>
+              <a:t>Klassendiagram</a:t>
             </a:r>
             <a:r>
               <a:rPr lang="en-US" dirty="0"/>
@@ -7230,25 +7215,7 @@
             </a:r>
             <a:r>
               <a:rPr lang="en-US" dirty="0" err="1"/>
-              <a:t>verbessern</a:t>
-            </a:r>
-            <a:endParaRPr lang="en-US" dirty="0"/>
-          </a:p>
-          <a:p>
-            <a:endParaRPr lang="en-US" dirty="0"/>
-          </a:p>
-          <a:p>
-            <a:r>
-              <a:rPr lang="en-US" dirty="0" err="1"/>
-              <a:t>Haben</a:t>
-            </a:r>
-            <a:r>
-              <a:rPr lang="en-US" dirty="0"/>
-              <a:t> nun </a:t>
-            </a:r>
-            <a:r>
-              <a:rPr lang="en-US" dirty="0" err="1"/>
-              <a:t>mehr</a:t>
+              <a:t>extrem</a:t>
             </a:r>
             <a:r>
               <a:rPr lang="en-US" dirty="0"/>
@@ -7256,15 +7223,7 @@
             </a:r>
             <a:r>
               <a:rPr lang="en-US" dirty="0" err="1"/>
-              <a:t>Klarheit</a:t>
-            </a:r>
-            <a:r>
-              <a:rPr lang="en-US" dirty="0"/>
-              <a:t>, wo </a:t>
-            </a:r>
-            <a:r>
-              <a:rPr lang="en-US" dirty="0" err="1"/>
-              <a:t>wir</a:t>
+              <a:t>wertvoll</a:t>
             </a:r>
             <a:r>
               <a:rPr lang="en-US" dirty="0"/>
@@ -7272,7 +7231,85 @@
             </a:r>
             <a:r>
               <a:rPr lang="en-US" dirty="0" err="1"/>
-              <a:t>hinwollen</a:t>
+              <a:t>für</a:t>
+            </a:r>
+            <a:r>
+              <a:rPr lang="en-US" dirty="0"/>
+              <a:t> das </a:t>
+            </a:r>
+            <a:r>
+              <a:rPr lang="en-US" dirty="0" err="1"/>
+              <a:t>technische</a:t>
+            </a:r>
+            <a:r>
+              <a:rPr lang="en-US" dirty="0"/>
+              <a:t> </a:t>
+            </a:r>
+            <a:r>
+              <a:rPr lang="en-US" dirty="0" err="1"/>
+              <a:t>Verständnis</a:t>
+            </a:r>
+            <a:endParaRPr lang="en-US" dirty="0"/>
+          </a:p>
+          <a:p>
+            <a:endParaRPr lang="en-US" dirty="0"/>
+          </a:p>
+          <a:p>
+            <a:r>
+              <a:rPr lang="en-US" dirty="0"/>
+              <a:t>Das </a:t>
+            </a:r>
+            <a:r>
+              <a:rPr lang="en-US" dirty="0" err="1"/>
+              <a:t>Schätzen</a:t>
+            </a:r>
+            <a:r>
+              <a:rPr lang="en-US" dirty="0"/>
+              <a:t> der </a:t>
+            </a:r>
+            <a:r>
+              <a:rPr lang="en-US" dirty="0" err="1"/>
+              <a:t>Stunden</a:t>
+            </a:r>
+            <a:r>
+              <a:rPr lang="en-US" dirty="0"/>
+              <a:t> </a:t>
+            </a:r>
+            <a:r>
+              <a:rPr lang="en-US" dirty="0" err="1"/>
+              <a:t>für</a:t>
+            </a:r>
+            <a:r>
+              <a:rPr lang="en-US" dirty="0"/>
+              <a:t> den </a:t>
+            </a:r>
+            <a:r>
+              <a:rPr lang="en-US" dirty="0" err="1"/>
+              <a:t>Aufwand</a:t>
+            </a:r>
+            <a:r>
+              <a:rPr lang="en-US" dirty="0"/>
+              <a:t> </a:t>
+            </a:r>
+            <a:r>
+              <a:rPr lang="en-US" dirty="0" err="1"/>
+              <a:t>ist</a:t>
+            </a:r>
+            <a:r>
+              <a:rPr lang="en-US" dirty="0"/>
+              <a:t> </a:t>
+            </a:r>
+            <a:r>
+              <a:rPr lang="en-US" dirty="0" err="1"/>
+              <a:t>sehr</a:t>
+            </a:r>
+            <a:r>
+              <a:rPr lang="en-US" dirty="0"/>
+              <a:t> </a:t>
+            </a:r>
+            <a:r>
+              <a:rPr lang="en-US" dirty="0" err="1"/>
+              <a:t>schwierig</a:t>
             </a:r>
             <a:endParaRPr lang="en-US" dirty="0"/>
           </a:p>
@@ -8006,12 +8043,19 @@
 </file>
 
 <file path=customXml/item1.xml><?xml version="1.0" encoding="utf-8"?>
-<?mso-contentType ?>
-<FormTemplates xmlns="http://schemas.microsoft.com/sharepoint/v3/contenttype/forms">
-  <Display>DocumentLibraryForm</Display>
-  <Edit>DocumentLibraryForm</Edit>
-  <New>DocumentLibraryForm</New>
-</FormTemplates>
+<p:properties xmlns:p="http://schemas.microsoft.com/office/2006/metadata/properties" xmlns:xsi="http://www.w3.org/2001/XMLSchema-instance" xmlns:pc="http://schemas.microsoft.com/office/infopath/2007/PartnerControls">
+  <documentManagement>
+    <QMPilot_DokID xmlns="2551ef7e-3b29-44d1-a8ad-ef34c26bfc60">470</QMPilot_DokID>
+    <BfhIntranetDepartmentText xmlns="f6f68f68-5570-446d-b1e6-2310e70d83d3">
+      <Terms xmlns="http://schemas.microsoft.com/office/infopath/2007/PartnerControls">
+        <TermInfo xmlns="http://schemas.microsoft.com/office/infopath/2007/PartnerControls">
+          <TermName xmlns="http://schemas.microsoft.com/office/infopath/2007/PartnerControls">Vorlage</TermName>
+          <TermId xmlns="http://schemas.microsoft.com/office/infopath/2007/PartnerControls">de1a6d3c-ac6a-4b34-8edd-308eb81066db</TermId>
+        </TermInfo>
+      </Terms>
+    </BfhIntranetDepartmentText>
+  </documentManagement>
+</p:properties>
 </file>
 
 <file path=customXml/item2.xml><?xml version="1.0" encoding="utf-8"?>
@@ -8154,25 +8198,21 @@
 </file>
 
 <file path=customXml/item3.xml><?xml version="1.0" encoding="utf-8"?>
-<p:properties xmlns:p="http://schemas.microsoft.com/office/2006/metadata/properties" xmlns:xsi="http://www.w3.org/2001/XMLSchema-instance" xmlns:pc="http://schemas.microsoft.com/office/infopath/2007/PartnerControls">
-  <documentManagement>
-    <QMPilot_DokID xmlns="2551ef7e-3b29-44d1-a8ad-ef34c26bfc60">470</QMPilot_DokID>
-    <BfhIntranetDepartmentText xmlns="f6f68f68-5570-446d-b1e6-2310e70d83d3">
-      <Terms xmlns="http://schemas.microsoft.com/office/infopath/2007/PartnerControls">
-        <TermInfo xmlns="http://schemas.microsoft.com/office/infopath/2007/PartnerControls">
-          <TermName xmlns="http://schemas.microsoft.com/office/infopath/2007/PartnerControls">Vorlage</TermName>
-          <TermId xmlns="http://schemas.microsoft.com/office/infopath/2007/PartnerControls">de1a6d3c-ac6a-4b34-8edd-308eb81066db</TermId>
-        </TermInfo>
-      </Terms>
-    </BfhIntranetDepartmentText>
-  </documentManagement>
-</p:properties>
+<?mso-contentType ?>
+<FormTemplates xmlns="http://schemas.microsoft.com/sharepoint/v3/contenttype/forms">
+  <Display>DocumentLibraryForm</Display>
+  <Edit>DocumentLibraryForm</Edit>
+  <New>DocumentLibraryForm</New>
+</FormTemplates>
 </file>
 
 <file path=customXml/itemProps1.xml><?xml version="1.0" encoding="utf-8"?>
-<ds:datastoreItem xmlns:ds="http://schemas.openxmlformats.org/officeDocument/2006/customXml" ds:itemID="{9D47BE21-B709-4D16-ABB2-11D40677E528}">
+<ds:datastoreItem xmlns:ds="http://schemas.openxmlformats.org/officeDocument/2006/customXml" ds:itemID="{A0E21803-70F9-41A8-9C11-39A2457CDDF7}">
   <ds:schemaRefs>
-    <ds:schemaRef ds:uri="http://schemas.microsoft.com/sharepoint/v3/contenttype/forms"/>
+    <ds:schemaRef ds:uri="http://schemas.microsoft.com/office/2006/metadata/properties"/>
+    <ds:schemaRef ds:uri="http://schemas.microsoft.com/office/infopath/2007/PartnerControls"/>
+    <ds:schemaRef ds:uri="2551ef7e-3b29-44d1-a8ad-ef34c26bfc60"/>
+    <ds:schemaRef ds:uri="f6f68f68-5570-446d-b1e6-2310e70d83d3"/>
   </ds:schemaRefs>
 </ds:datastoreItem>
 </file>
@@ -8197,12 +8237,9 @@
 </file>
 
 <file path=customXml/itemProps3.xml><?xml version="1.0" encoding="utf-8"?>
-<ds:datastoreItem xmlns:ds="http://schemas.openxmlformats.org/officeDocument/2006/customXml" ds:itemID="{A0E21803-70F9-41A8-9C11-39A2457CDDF7}">
+<ds:datastoreItem xmlns:ds="http://schemas.openxmlformats.org/officeDocument/2006/customXml" ds:itemID="{9D47BE21-B709-4D16-ABB2-11D40677E528}">
   <ds:schemaRefs>
-    <ds:schemaRef ds:uri="http://schemas.microsoft.com/office/2006/metadata/properties"/>
-    <ds:schemaRef ds:uri="http://schemas.microsoft.com/office/infopath/2007/PartnerControls"/>
-    <ds:schemaRef ds:uri="2551ef7e-3b29-44d1-a8ad-ef34c26bfc60"/>
-    <ds:schemaRef ds:uri="f6f68f68-5570-446d-b1e6-2310e70d83d3"/>
+    <ds:schemaRef ds:uri="http://schemas.microsoft.com/sharepoint/v3/contenttype/forms"/>
   </ds:schemaRefs>
 </ds:datastoreItem>
 </file>
</xml_diff>

<commit_message>
update presi after presi =)
</commit_message>
<xml_diff>
--- a/doc/04-ScrumSetup/Task_3&4_Presentation.pptx
+++ b/doc/04-ScrumSetup/Task_3&4_Presentation.pptx
@@ -6726,7 +6726,7 @@
           <p:cNvPr id="14" name="Grafik 13">
             <a:extLst>
               <a:ext uri="{FF2B5EF4-FFF2-40B4-BE49-F238E27FC236}">
-                <a16:creationId xmlns="" xmlns:a16="http://schemas.microsoft.com/office/drawing/2014/main" id="{2E9A2A1D-37DF-4512-A325-1061D0799F67}"/>
+                <a16:creationId xmlns:a16="http://schemas.microsoft.com/office/drawing/2014/main" xmlns="" id="{2E9A2A1D-37DF-4512-A325-1061D0799F67}"/>
               </a:ext>
             </a:extLst>
           </p:cNvPr>
@@ -6756,6 +6756,13 @@
   <p:clrMapOvr>
     <a:masterClrMapping/>
   </p:clrMapOvr>
+  <p:timing>
+    <p:tnLst>
+      <p:par>
+        <p:cTn id="1" dur="indefinite" restart="never" nodeType="tmRoot"/>
+      </p:par>
+    </p:tnLst>
+  </p:timing>
 </p:sld>
 </file>
 
@@ -6781,7 +6788,7 @@
           <p:cNvPr id="3" name="Inhaltsplatzhalter 2">
             <a:extLst>
               <a:ext uri="{FF2B5EF4-FFF2-40B4-BE49-F238E27FC236}">
-                <a16:creationId xmlns="" xmlns:a16="http://schemas.microsoft.com/office/drawing/2014/main" id="{FE1CBA32-8850-464B-8859-1FC3315649A2}"/>
+                <a16:creationId xmlns:a16="http://schemas.microsoft.com/office/drawing/2014/main" xmlns="" id="{FE1CBA32-8850-464B-8859-1FC3315649A2}"/>
               </a:ext>
             </a:extLst>
           </p:cNvPr>
@@ -6850,6 +6857,13 @@
   <p:clrMapOvr>
     <a:masterClrMapping/>
   </p:clrMapOvr>
+  <p:timing>
+    <p:tnLst>
+      <p:par>
+        <p:cTn id="1" dur="indefinite" restart="never" nodeType="tmRoot"/>
+      </p:par>
+    </p:tnLst>
+  </p:timing>
 </p:sld>
 </file>
 
@@ -6907,19 +6921,11 @@
       </p:sp>
       <p:pic>
         <p:nvPicPr>
-          <p:cNvPr id="5" name="Inhaltsplatzhalter 4">
-            <a:extLst>
-              <a:ext uri="{FF2B5EF4-FFF2-40B4-BE49-F238E27FC236}">
-                <a16:creationId xmlns="" xmlns:a16="http://schemas.microsoft.com/office/drawing/2014/main" id="{15FDAE4E-7871-4386-8CD1-AA471DAE9E4A}"/>
-              </a:ext>
-            </a:extLst>
-          </p:cNvPr>
+          <p:cNvPr id="4" name="Picture 3"/>
           <p:cNvPicPr>
-            <a:picLocks noGrp="1" noChangeAspect="1"/>
+            <a:picLocks noChangeAspect="1"/>
           </p:cNvPicPr>
-          <p:nvPr>
-            <p:ph sz="half" idx="1"/>
-          </p:nvPr>
+          <p:nvPr/>
         </p:nvPicPr>
         <p:blipFill>
           <a:blip r:embed="rId2"/>
@@ -6929,9 +6935,12 @@
         </p:blipFill>
         <p:spPr>
           <a:xfrm>
-            <a:off x="1043865" y="1003067"/>
-            <a:ext cx="9957069" cy="5189107"/>
+            <a:off x="1086198" y="900000"/>
+            <a:ext cx="9321800" cy="4889500"/>
           </a:xfrm>
+          <a:prstGeom prst="rect">
+            <a:avLst/>
+          </a:prstGeom>
         </p:spPr>
       </p:pic>
     </p:spTree>
@@ -7298,6 +7307,13 @@
   <p:clrMapOvr>
     <a:masterClrMapping/>
   </p:clrMapOvr>
+  <p:timing>
+    <p:tnLst>
+      <p:par>
+        <p:cTn id="1" dur="indefinite" restart="never" nodeType="tmRoot"/>
+      </p:par>
+    </p:tnLst>
+  </p:timing>
 </p:sld>
 </file>
 
@@ -7479,6 +7495,13 @@
   <p:clrMapOvr>
     <a:masterClrMapping/>
   </p:clrMapOvr>
+  <p:timing>
+    <p:tnLst>
+      <p:par>
+        <p:cTn id="1" dur="indefinite" restart="never" nodeType="tmRoot"/>
+      </p:par>
+    </p:tnLst>
+  </p:timing>
 </p:sld>
 </file>
 
@@ -7562,6 +7585,13 @@
   <p:clrMapOvr>
     <a:masterClrMapping/>
   </p:clrMapOvr>
+  <p:timing>
+    <p:tnLst>
+      <p:par>
+        <p:cTn id="1" dur="indefinite" restart="never" nodeType="tmRoot"/>
+      </p:par>
+    </p:tnLst>
+  </p:timing>
 </p:sld>
 </file>
 

</xml_diff>